<commit_message>
Add the allReady project to the links
</commit_message>
<xml_diff>
--- a/MeetUp 24-03-206 net core aspnet core/Meetup24-03-2016.pptx
+++ b/MeetUp 24-03-206 net core aspnet core/Meetup24-03-2016.pptx
@@ -216,7 +216,7 @@
           <a:p>
             <a:fld id="{3B9BFD26-3B6D-42C5-BD0F-C45581ADE71D}" type="datetimeFigureOut">
               <a:rPr lang="en-US"/>
-              <a:t>3/22/2016</a:t>
+              <a:t>4/2/2016</a:t>
             </a:fld>
             <a:endParaRPr lang="en-US"/>
           </a:p>
@@ -884,7 +884,7 @@
           <a:p>
             <a:fld id="{0203E767-AC7A-43A3-BE0F-F2AE116D7067}" type="slidenum">
               <a:rPr lang="en-US"/>
-              <a:t>6</a:t>
+              <a:t>8</a:t>
             </a:fld>
             <a:endParaRPr lang="en-US"/>
           </a:p>
@@ -1034,7 +1034,7 @@
           <a:p>
             <a:fld id="{57EECDCE-D2B3-42DA-89CA-3F4E490F6CDF}" type="datetimeFigureOut">
               <a:rPr lang="el-GR" smtClean="0"/>
-              <a:t>22/3/2016</a:t>
+              <a:t>2/4/2016</a:t>
             </a:fld>
             <a:endParaRPr lang="el-GR"/>
           </a:p>
@@ -1204,7 +1204,7 @@
           <a:p>
             <a:fld id="{57EECDCE-D2B3-42DA-89CA-3F4E490F6CDF}" type="datetimeFigureOut">
               <a:rPr lang="el-GR" smtClean="0"/>
-              <a:t>22/3/2016</a:t>
+              <a:t>2/4/2016</a:t>
             </a:fld>
             <a:endParaRPr lang="el-GR"/>
           </a:p>
@@ -1384,7 +1384,7 @@
           <a:p>
             <a:fld id="{57EECDCE-D2B3-42DA-89CA-3F4E490F6CDF}" type="datetimeFigureOut">
               <a:rPr lang="el-GR" smtClean="0"/>
-              <a:t>22/3/2016</a:t>
+              <a:t>2/4/2016</a:t>
             </a:fld>
             <a:endParaRPr lang="el-GR"/>
           </a:p>
@@ -1554,7 +1554,7 @@
           <a:p>
             <a:fld id="{57EECDCE-D2B3-42DA-89CA-3F4E490F6CDF}" type="datetimeFigureOut">
               <a:rPr lang="el-GR" smtClean="0"/>
-              <a:t>22/3/2016</a:t>
+              <a:t>2/4/2016</a:t>
             </a:fld>
             <a:endParaRPr lang="el-GR"/>
           </a:p>
@@ -1800,7 +1800,7 @@
           <a:p>
             <a:fld id="{57EECDCE-D2B3-42DA-89CA-3F4E490F6CDF}" type="datetimeFigureOut">
               <a:rPr lang="el-GR" smtClean="0"/>
-              <a:t>22/3/2016</a:t>
+              <a:t>2/4/2016</a:t>
             </a:fld>
             <a:endParaRPr lang="el-GR"/>
           </a:p>
@@ -2032,7 +2032,7 @@
           <a:p>
             <a:fld id="{57EECDCE-D2B3-42DA-89CA-3F4E490F6CDF}" type="datetimeFigureOut">
               <a:rPr lang="el-GR" smtClean="0"/>
-              <a:t>22/3/2016</a:t>
+              <a:t>2/4/2016</a:t>
             </a:fld>
             <a:endParaRPr lang="el-GR"/>
           </a:p>
@@ -2399,7 +2399,7 @@
           <a:p>
             <a:fld id="{57EECDCE-D2B3-42DA-89CA-3F4E490F6CDF}" type="datetimeFigureOut">
               <a:rPr lang="el-GR" smtClean="0"/>
-              <a:t>22/3/2016</a:t>
+              <a:t>2/4/2016</a:t>
             </a:fld>
             <a:endParaRPr lang="el-GR"/>
           </a:p>
@@ -2517,7 +2517,7 @@
           <a:p>
             <a:fld id="{57EECDCE-D2B3-42DA-89CA-3F4E490F6CDF}" type="datetimeFigureOut">
               <a:rPr lang="el-GR" smtClean="0"/>
-              <a:t>22/3/2016</a:t>
+              <a:t>2/4/2016</a:t>
             </a:fld>
             <a:endParaRPr lang="el-GR"/>
           </a:p>
@@ -2612,7 +2612,7 @@
           <a:p>
             <a:fld id="{57EECDCE-D2B3-42DA-89CA-3F4E490F6CDF}" type="datetimeFigureOut">
               <a:rPr lang="el-GR" smtClean="0"/>
-              <a:t>22/3/2016</a:t>
+              <a:t>2/4/2016</a:t>
             </a:fld>
             <a:endParaRPr lang="el-GR"/>
           </a:p>
@@ -2889,7 +2889,7 @@
           <a:p>
             <a:fld id="{57EECDCE-D2B3-42DA-89CA-3F4E490F6CDF}" type="datetimeFigureOut">
               <a:rPr lang="el-GR" smtClean="0"/>
-              <a:t>22/3/2016</a:t>
+              <a:t>2/4/2016</a:t>
             </a:fld>
             <a:endParaRPr lang="el-GR"/>
           </a:p>
@@ -3142,7 +3142,7 @@
           <a:p>
             <a:fld id="{57EECDCE-D2B3-42DA-89CA-3F4E490F6CDF}" type="datetimeFigureOut">
               <a:rPr lang="el-GR" smtClean="0"/>
-              <a:t>22/3/2016</a:t>
+              <a:t>2/4/2016</a:t>
             </a:fld>
             <a:endParaRPr lang="el-GR"/>
           </a:p>
@@ -3355,7 +3355,7 @@
           <a:p>
             <a:fld id="{57EECDCE-D2B3-42DA-89CA-3F4E490F6CDF}" type="datetimeFigureOut">
               <a:rPr lang="el-GR" smtClean="0"/>
-              <a:t>22/3/2016</a:t>
+              <a:t>2/4/2016</a:t>
             </a:fld>
             <a:endParaRPr lang="el-GR"/>
           </a:p>
@@ -5029,6 +5029,19 @@
               </a:rPr>
               <a:t>Middleware documentation</a:t>
             </a:r>
+            <a:endParaRPr lang="en-US" sz="2000" dirty="0"/>
+          </a:p>
+          <a:p>
+            <a:r>
+              <a:rPr lang="en-US" sz="2000" dirty="0">
+                <a:latin typeface="Calibri" charset="0"/>
+                <a:hlinkClick r:id="rId9"/>
+              </a:rPr>
+              <a:t>AllReady – Real project with asp.net core</a:t>
+            </a:r>
+            <a:endParaRPr lang="en-US" dirty="0">
+              <a:latin typeface="Calibri" charset="0"/>
+            </a:endParaRPr>
           </a:p>
           <a:p>
             <a:pPr marL="457200" lvl="1" indent="0">

</xml_diff>